<commit_message>
add special final round zoom
</commit_message>
<xml_diff>
--- a/MainEvents/Map.pptx
+++ b/MainEvents/Map.pptx
@@ -1390,7 +1390,7 @@
           <a:p>
             <a:fld id="{864DD136-2D4D-487D-88CA-EF10B8895367}" type="datetimeFigureOut">
               <a:rPr lang="en-US" smtClean="0"/>
-              <a:t>1/4/2023</a:t>
+              <a:t>1/6/2023</a:t>
             </a:fld>
             <a:endParaRPr lang="en-US"/>
           </a:p>
@@ -1485,7 +1485,7 @@
           <a:p>
             <a:fld id="{864DD136-2D4D-487D-88CA-EF10B8895367}" type="datetimeFigureOut">
               <a:rPr lang="en-US" smtClean="0"/>
-              <a:t>1/4/2023</a:t>
+              <a:t>1/6/2023</a:t>
             </a:fld>
             <a:endParaRPr lang="en-US"/>
           </a:p>
@@ -1762,7 +1762,7 @@
           <a:p>
             <a:fld id="{864DD136-2D4D-487D-88CA-EF10B8895367}" type="datetimeFigureOut">
               <a:rPr lang="en-US" smtClean="0"/>
-              <a:t>1/4/2023</a:t>
+              <a:t>1/6/2023</a:t>
             </a:fld>
             <a:endParaRPr lang="en-US"/>
           </a:p>
@@ -2019,7 +2019,7 @@
           <a:p>
             <a:fld id="{864DD136-2D4D-487D-88CA-EF10B8895367}" type="datetimeFigureOut">
               <a:rPr lang="en-US" smtClean="0"/>
-              <a:t>1/4/2023</a:t>
+              <a:t>1/6/2023</a:t>
             </a:fld>
             <a:endParaRPr lang="en-US"/>
           </a:p>
@@ -2189,7 +2189,7 @@
           <a:p>
             <a:fld id="{864DD136-2D4D-487D-88CA-EF10B8895367}" type="datetimeFigureOut">
               <a:rPr lang="en-US" smtClean="0"/>
-              <a:t>1/4/2023</a:t>
+              <a:t>1/6/2023</a:t>
             </a:fld>
             <a:endParaRPr lang="en-US"/>
           </a:p>
@@ -2369,7 +2369,7 @@
           <a:p>
             <a:fld id="{864DD136-2D4D-487D-88CA-EF10B8895367}" type="datetimeFigureOut">
               <a:rPr lang="en-US" smtClean="0"/>
-              <a:t>1/4/2023</a:t>
+              <a:t>1/6/2023</a:t>
             </a:fld>
             <a:endParaRPr lang="en-US"/>
           </a:p>
@@ -2561,7 +2561,7 @@
           <a:p>
             <a:fld id="{864DD136-2D4D-487D-88CA-EF10B8895367}" type="datetimeFigureOut">
               <a:rPr lang="en-US" smtClean="0"/>
-              <a:t>1/4/2023</a:t>
+              <a:t>1/6/2023</a:t>
             </a:fld>
             <a:endParaRPr lang="en-US"/>
           </a:p>
@@ -2731,7 +2731,7 @@
           <a:p>
             <a:fld id="{864DD136-2D4D-487D-88CA-EF10B8895367}" type="datetimeFigureOut">
               <a:rPr lang="en-US" smtClean="0"/>
-              <a:t>1/4/2023</a:t>
+              <a:t>1/6/2023</a:t>
             </a:fld>
             <a:endParaRPr lang="en-US"/>
           </a:p>
@@ -2975,7 +2975,7 @@
           <a:p>
             <a:fld id="{864DD136-2D4D-487D-88CA-EF10B8895367}" type="datetimeFigureOut">
               <a:rPr lang="en-US" smtClean="0"/>
-              <a:t>1/4/2023</a:t>
+              <a:t>1/6/2023</a:t>
             </a:fld>
             <a:endParaRPr lang="en-US"/>
           </a:p>
@@ -3207,7 +3207,7 @@
           <a:p>
             <a:fld id="{864DD136-2D4D-487D-88CA-EF10B8895367}" type="datetimeFigureOut">
               <a:rPr lang="en-US" smtClean="0"/>
-              <a:t>1/4/2023</a:t>
+              <a:t>1/6/2023</a:t>
             </a:fld>
             <a:endParaRPr lang="en-US"/>
           </a:p>
@@ -3607,7 +3607,7 @@
           <a:p>
             <a:fld id="{864DD136-2D4D-487D-88CA-EF10B8895367}" type="datetimeFigureOut">
               <a:rPr lang="en-US" smtClean="0"/>
-              <a:t>1/4/2023</a:t>
+              <a:t>1/6/2023</a:t>
             </a:fld>
             <a:endParaRPr lang="en-US"/>
           </a:p>
@@ -3725,7 +3725,7 @@
           <a:p>
             <a:fld id="{864DD136-2D4D-487D-88CA-EF10B8895367}" type="datetimeFigureOut">
               <a:rPr lang="en-US" smtClean="0"/>
-              <a:t>1/4/2023</a:t>
+              <a:t>1/6/2023</a:t>
             </a:fld>
             <a:endParaRPr lang="en-US"/>
           </a:p>
@@ -3820,7 +3820,7 @@
           <a:p>
             <a:fld id="{864DD136-2D4D-487D-88CA-EF10B8895367}" type="datetimeFigureOut">
               <a:rPr lang="en-US" smtClean="0"/>
-              <a:t>1/4/2023</a:t>
+              <a:t>1/6/2023</a:t>
             </a:fld>
             <a:endParaRPr lang="en-US"/>
           </a:p>
@@ -4097,7 +4097,7 @@
           <a:p>
             <a:fld id="{864DD136-2D4D-487D-88CA-EF10B8895367}" type="datetimeFigureOut">
               <a:rPr lang="en-US" smtClean="0"/>
-              <a:t>1/4/2023</a:t>
+              <a:t>1/6/2023</a:t>
             </a:fld>
             <a:endParaRPr lang="en-US"/>
           </a:p>
@@ -4354,7 +4354,7 @@
           <a:p>
             <a:fld id="{864DD136-2D4D-487D-88CA-EF10B8895367}" type="datetimeFigureOut">
               <a:rPr lang="en-US" smtClean="0"/>
-              <a:t>1/4/2023</a:t>
+              <a:t>1/6/2023</a:t>
             </a:fld>
             <a:endParaRPr lang="en-US"/>
           </a:p>
@@ -4524,7 +4524,7 @@
           <a:p>
             <a:fld id="{864DD136-2D4D-487D-88CA-EF10B8895367}" type="datetimeFigureOut">
               <a:rPr lang="en-US" smtClean="0"/>
-              <a:t>1/4/2023</a:t>
+              <a:t>1/6/2023</a:t>
             </a:fld>
             <a:endParaRPr lang="en-US"/>
           </a:p>
@@ -4704,7 +4704,7 @@
           <a:p>
             <a:fld id="{864DD136-2D4D-487D-88CA-EF10B8895367}" type="datetimeFigureOut">
               <a:rPr lang="en-US" smtClean="0"/>
-              <a:t>1/4/2023</a:t>
+              <a:t>1/6/2023</a:t>
             </a:fld>
             <a:endParaRPr lang="en-US"/>
           </a:p>
@@ -5334,7 +5334,7 @@
           <a:p>
             <a:fld id="{864DD136-2D4D-487D-88CA-EF10B8895367}" type="datetimeFigureOut">
               <a:rPr lang="en-US" smtClean="0"/>
-              <a:t>1/4/2023</a:t>
+              <a:t>1/6/2023</a:t>
             </a:fld>
             <a:endParaRPr lang="en-US"/>
           </a:p>
@@ -5504,7 +5504,7 @@
           <a:p>
             <a:fld id="{864DD136-2D4D-487D-88CA-EF10B8895367}" type="datetimeFigureOut">
               <a:rPr lang="en-US" smtClean="0"/>
-              <a:t>1/4/2023</a:t>
+              <a:t>1/6/2023</a:t>
             </a:fld>
             <a:endParaRPr lang="en-US"/>
           </a:p>
@@ -5748,7 +5748,7 @@
           <a:p>
             <a:fld id="{864DD136-2D4D-487D-88CA-EF10B8895367}" type="datetimeFigureOut">
               <a:rPr lang="en-US" smtClean="0"/>
-              <a:t>1/4/2023</a:t>
+              <a:t>1/6/2023</a:t>
             </a:fld>
             <a:endParaRPr lang="en-US"/>
           </a:p>
@@ -5980,7 +5980,7 @@
           <a:p>
             <a:fld id="{864DD136-2D4D-487D-88CA-EF10B8895367}" type="datetimeFigureOut">
               <a:rPr lang="en-US" smtClean="0"/>
-              <a:t>1/4/2023</a:t>
+              <a:t>1/6/2023</a:t>
             </a:fld>
             <a:endParaRPr lang="en-US"/>
           </a:p>
@@ -6347,7 +6347,7 @@
           <a:p>
             <a:fld id="{864DD136-2D4D-487D-88CA-EF10B8895367}" type="datetimeFigureOut">
               <a:rPr lang="en-US" smtClean="0"/>
-              <a:t>1/4/2023</a:t>
+              <a:t>1/6/2023</a:t>
             </a:fld>
             <a:endParaRPr lang="en-US"/>
           </a:p>
@@ -7806,7 +7806,7 @@
           <a:p>
             <a:fld id="{C764DE79-268F-4C1A-8933-263129D2AF90}" type="datetimeFigureOut">
               <a:rPr lang="en-US" dirty="0"/>
-              <a:t>1/4/2023</a:t>
+              <a:t>1/6/2023</a:t>
             </a:fld>
             <a:endParaRPr lang="en-US" dirty="0"/>
           </a:p>
@@ -8347,7 +8347,7 @@
           <a:p>
             <a:fld id="{C764DE79-268F-4C1A-8933-263129D2AF90}" type="datetimeFigureOut">
               <a:rPr lang="en-US" dirty="0"/>
-              <a:t>1/4/2023</a:t>
+              <a:t>1/6/2023</a:t>
             </a:fld>
             <a:endParaRPr lang="en-US" dirty="0"/>
           </a:p>
@@ -13102,7 +13102,7 @@
                 <a:ea typeface="+mn-ea"/>
                 <a:cs typeface="+mn-cs"/>
               </a:rPr>
-              <a:t>Miami University: 10, 11</a:t>
+              <a:t>Miami University: 19, 20</a:t>
             </a:r>
           </a:p>
           <a:p>

</xml_diff>

<commit_message>
Update gitbook 2023-01-08 09:07:34
</commit_message>
<xml_diff>
--- a/MainEvents/Map.pptx
+++ b/MainEvents/Map.pptx
@@ -1390,7 +1390,7 @@
           <a:p>
             <a:fld id="{864DD136-2D4D-487D-88CA-EF10B8895367}" type="datetimeFigureOut">
               <a:rPr lang="en-US" smtClean="0"/>
-              <a:t>1/4/2023</a:t>
+              <a:t>1/6/2023</a:t>
             </a:fld>
             <a:endParaRPr lang="en-US"/>
           </a:p>
@@ -1485,7 +1485,7 @@
           <a:p>
             <a:fld id="{864DD136-2D4D-487D-88CA-EF10B8895367}" type="datetimeFigureOut">
               <a:rPr lang="en-US" smtClean="0"/>
-              <a:t>1/4/2023</a:t>
+              <a:t>1/6/2023</a:t>
             </a:fld>
             <a:endParaRPr lang="en-US"/>
           </a:p>
@@ -1762,7 +1762,7 @@
           <a:p>
             <a:fld id="{864DD136-2D4D-487D-88CA-EF10B8895367}" type="datetimeFigureOut">
               <a:rPr lang="en-US" smtClean="0"/>
-              <a:t>1/4/2023</a:t>
+              <a:t>1/6/2023</a:t>
             </a:fld>
             <a:endParaRPr lang="en-US"/>
           </a:p>
@@ -2019,7 +2019,7 @@
           <a:p>
             <a:fld id="{864DD136-2D4D-487D-88CA-EF10B8895367}" type="datetimeFigureOut">
               <a:rPr lang="en-US" smtClean="0"/>
-              <a:t>1/4/2023</a:t>
+              <a:t>1/6/2023</a:t>
             </a:fld>
             <a:endParaRPr lang="en-US"/>
           </a:p>
@@ -2189,7 +2189,7 @@
           <a:p>
             <a:fld id="{864DD136-2D4D-487D-88CA-EF10B8895367}" type="datetimeFigureOut">
               <a:rPr lang="en-US" smtClean="0"/>
-              <a:t>1/4/2023</a:t>
+              <a:t>1/6/2023</a:t>
             </a:fld>
             <a:endParaRPr lang="en-US"/>
           </a:p>
@@ -2369,7 +2369,7 @@
           <a:p>
             <a:fld id="{864DD136-2D4D-487D-88CA-EF10B8895367}" type="datetimeFigureOut">
               <a:rPr lang="en-US" smtClean="0"/>
-              <a:t>1/4/2023</a:t>
+              <a:t>1/6/2023</a:t>
             </a:fld>
             <a:endParaRPr lang="en-US"/>
           </a:p>
@@ -2561,7 +2561,7 @@
           <a:p>
             <a:fld id="{864DD136-2D4D-487D-88CA-EF10B8895367}" type="datetimeFigureOut">
               <a:rPr lang="en-US" smtClean="0"/>
-              <a:t>1/4/2023</a:t>
+              <a:t>1/6/2023</a:t>
             </a:fld>
             <a:endParaRPr lang="en-US"/>
           </a:p>
@@ -2731,7 +2731,7 @@
           <a:p>
             <a:fld id="{864DD136-2D4D-487D-88CA-EF10B8895367}" type="datetimeFigureOut">
               <a:rPr lang="en-US" smtClean="0"/>
-              <a:t>1/4/2023</a:t>
+              <a:t>1/6/2023</a:t>
             </a:fld>
             <a:endParaRPr lang="en-US"/>
           </a:p>
@@ -2975,7 +2975,7 @@
           <a:p>
             <a:fld id="{864DD136-2D4D-487D-88CA-EF10B8895367}" type="datetimeFigureOut">
               <a:rPr lang="en-US" smtClean="0"/>
-              <a:t>1/4/2023</a:t>
+              <a:t>1/6/2023</a:t>
             </a:fld>
             <a:endParaRPr lang="en-US"/>
           </a:p>
@@ -3207,7 +3207,7 @@
           <a:p>
             <a:fld id="{864DD136-2D4D-487D-88CA-EF10B8895367}" type="datetimeFigureOut">
               <a:rPr lang="en-US" smtClean="0"/>
-              <a:t>1/4/2023</a:t>
+              <a:t>1/6/2023</a:t>
             </a:fld>
             <a:endParaRPr lang="en-US"/>
           </a:p>
@@ -3607,7 +3607,7 @@
           <a:p>
             <a:fld id="{864DD136-2D4D-487D-88CA-EF10B8895367}" type="datetimeFigureOut">
               <a:rPr lang="en-US" smtClean="0"/>
-              <a:t>1/4/2023</a:t>
+              <a:t>1/6/2023</a:t>
             </a:fld>
             <a:endParaRPr lang="en-US"/>
           </a:p>
@@ -3725,7 +3725,7 @@
           <a:p>
             <a:fld id="{864DD136-2D4D-487D-88CA-EF10B8895367}" type="datetimeFigureOut">
               <a:rPr lang="en-US" smtClean="0"/>
-              <a:t>1/4/2023</a:t>
+              <a:t>1/6/2023</a:t>
             </a:fld>
             <a:endParaRPr lang="en-US"/>
           </a:p>
@@ -3820,7 +3820,7 @@
           <a:p>
             <a:fld id="{864DD136-2D4D-487D-88CA-EF10B8895367}" type="datetimeFigureOut">
               <a:rPr lang="en-US" smtClean="0"/>
-              <a:t>1/4/2023</a:t>
+              <a:t>1/6/2023</a:t>
             </a:fld>
             <a:endParaRPr lang="en-US"/>
           </a:p>
@@ -4097,7 +4097,7 @@
           <a:p>
             <a:fld id="{864DD136-2D4D-487D-88CA-EF10B8895367}" type="datetimeFigureOut">
               <a:rPr lang="en-US" smtClean="0"/>
-              <a:t>1/4/2023</a:t>
+              <a:t>1/6/2023</a:t>
             </a:fld>
             <a:endParaRPr lang="en-US"/>
           </a:p>
@@ -4354,7 +4354,7 @@
           <a:p>
             <a:fld id="{864DD136-2D4D-487D-88CA-EF10B8895367}" type="datetimeFigureOut">
               <a:rPr lang="en-US" smtClean="0"/>
-              <a:t>1/4/2023</a:t>
+              <a:t>1/6/2023</a:t>
             </a:fld>
             <a:endParaRPr lang="en-US"/>
           </a:p>
@@ -4524,7 +4524,7 @@
           <a:p>
             <a:fld id="{864DD136-2D4D-487D-88CA-EF10B8895367}" type="datetimeFigureOut">
               <a:rPr lang="en-US" smtClean="0"/>
-              <a:t>1/4/2023</a:t>
+              <a:t>1/6/2023</a:t>
             </a:fld>
             <a:endParaRPr lang="en-US"/>
           </a:p>
@@ -4704,7 +4704,7 @@
           <a:p>
             <a:fld id="{864DD136-2D4D-487D-88CA-EF10B8895367}" type="datetimeFigureOut">
               <a:rPr lang="en-US" smtClean="0"/>
-              <a:t>1/4/2023</a:t>
+              <a:t>1/6/2023</a:t>
             </a:fld>
             <a:endParaRPr lang="en-US"/>
           </a:p>
@@ -5334,7 +5334,7 @@
           <a:p>
             <a:fld id="{864DD136-2D4D-487D-88CA-EF10B8895367}" type="datetimeFigureOut">
               <a:rPr lang="en-US" smtClean="0"/>
-              <a:t>1/4/2023</a:t>
+              <a:t>1/6/2023</a:t>
             </a:fld>
             <a:endParaRPr lang="en-US"/>
           </a:p>
@@ -5504,7 +5504,7 @@
           <a:p>
             <a:fld id="{864DD136-2D4D-487D-88CA-EF10B8895367}" type="datetimeFigureOut">
               <a:rPr lang="en-US" smtClean="0"/>
-              <a:t>1/4/2023</a:t>
+              <a:t>1/6/2023</a:t>
             </a:fld>
             <a:endParaRPr lang="en-US"/>
           </a:p>
@@ -5748,7 +5748,7 @@
           <a:p>
             <a:fld id="{864DD136-2D4D-487D-88CA-EF10B8895367}" type="datetimeFigureOut">
               <a:rPr lang="en-US" smtClean="0"/>
-              <a:t>1/4/2023</a:t>
+              <a:t>1/6/2023</a:t>
             </a:fld>
             <a:endParaRPr lang="en-US"/>
           </a:p>
@@ -5980,7 +5980,7 @@
           <a:p>
             <a:fld id="{864DD136-2D4D-487D-88CA-EF10B8895367}" type="datetimeFigureOut">
               <a:rPr lang="en-US" smtClean="0"/>
-              <a:t>1/4/2023</a:t>
+              <a:t>1/6/2023</a:t>
             </a:fld>
             <a:endParaRPr lang="en-US"/>
           </a:p>
@@ -6347,7 +6347,7 @@
           <a:p>
             <a:fld id="{864DD136-2D4D-487D-88CA-EF10B8895367}" type="datetimeFigureOut">
               <a:rPr lang="en-US" smtClean="0"/>
-              <a:t>1/4/2023</a:t>
+              <a:t>1/6/2023</a:t>
             </a:fld>
             <a:endParaRPr lang="en-US"/>
           </a:p>
@@ -7806,7 +7806,7 @@
           <a:p>
             <a:fld id="{C764DE79-268F-4C1A-8933-263129D2AF90}" type="datetimeFigureOut">
               <a:rPr lang="en-US" dirty="0"/>
-              <a:t>1/4/2023</a:t>
+              <a:t>1/6/2023</a:t>
             </a:fld>
             <a:endParaRPr lang="en-US" dirty="0"/>
           </a:p>
@@ -8347,7 +8347,7 @@
           <a:p>
             <a:fld id="{C764DE79-268F-4C1A-8933-263129D2AF90}" type="datetimeFigureOut">
               <a:rPr lang="en-US" dirty="0"/>
-              <a:t>1/4/2023</a:t>
+              <a:t>1/6/2023</a:t>
             </a:fld>
             <a:endParaRPr lang="en-US" dirty="0"/>
           </a:p>
@@ -13102,7 +13102,7 @@
                 <a:ea typeface="+mn-ea"/>
                 <a:cs typeface="+mn-cs"/>
               </a:rPr>
-              <a:t>Miami University: 10, 11</a:t>
+              <a:t>Miami University: 19, 20</a:t>
             </a:r>
           </a:p>
           <a:p>

</xml_diff>